<commit_message>
revising soln MQ_sets_to_membership_no_intro, cltx errors
</commit_message>
<xml_diff>
--- a/spring13/slides13/relations.pptx
+++ b/spring13/slides13/relations.pptx
@@ -7241,11 +7241,11 @@
   <p:clrMapOvr>
     <a:masterClrMapping/>
   </p:clrMapOvr>
-  <mc:AlternateContent xmlns:mc="http://schemas.openxmlformats.org/markup-compatibility/2006">
-    <mc:Choice xmlns:p14="http://schemas.microsoft.com/office/powerpoint/2010/main" Requires="p14">
+  <mc:AlternateContent xmlns:mc="http://schemas.openxmlformats.org/markup-compatibility/2006" xmlns:p14="http://schemas.microsoft.com/office/powerpoint/2010/main">
+    <mc:Choice Requires="p14">
       <p:transition spd="slow" p14:dur="2000"/>
     </mc:Choice>
-    <mc:Fallback>
+    <mc:Fallback xmlns="">
       <p:transition xmlns:p14="http://schemas.microsoft.com/office/powerpoint/2010/main" spd="slow"/>
     </mc:Fallback>
   </mc:AlternateContent>
@@ -8608,13 +8608,13 @@
   <p:clrMapOvr>
     <a:masterClrMapping/>
   </p:clrMapOvr>
-  <mc:AlternateContent xmlns:mc="http://schemas.openxmlformats.org/markup-compatibility/2006">
-    <mc:Choice xmlns:p14="http://schemas.microsoft.com/office/powerpoint/2010/main" Requires="p14">
+  <mc:AlternateContent xmlns:mc="http://schemas.openxmlformats.org/markup-compatibility/2006" xmlns:p14="http://schemas.microsoft.com/office/powerpoint/2010/main">
+    <mc:Choice Requires="p14">
       <p:transition spd="med" p14:dur="700">
         <p:fade/>
       </p:transition>
     </mc:Choice>
-    <mc:Fallback>
+    <mc:Fallback xmlns="">
       <p:transition xmlns:p14="http://schemas.microsoft.com/office/powerpoint/2010/main" spd="med">
         <p:fade/>
       </p:transition>
@@ -9259,7 +9259,7 @@
           <a:graphicData uri="http://schemas.openxmlformats.org/presentationml/2006/ole">
             <mc:AlternateContent xmlns:mc="http://schemas.openxmlformats.org/markup-compatibility/2006">
               <mc:Choice xmlns:v="urn:schemas-microsoft-com:vml" Requires="v">
-                <p:oleObj spid="_x0000_s642066" name="Equation" r:id="rId4" imgW="1066800" imgH="495300" progId="Equation.3">
+                <p:oleObj spid="_x0000_s642068" name="Equation" r:id="rId4" imgW="1066800" imgH="495300" progId="Equation.3">
                   <p:embed/>
                 </p:oleObj>
               </mc:Choice>
@@ -11444,7 +11444,7 @@
           <a:graphicData uri="http://schemas.openxmlformats.org/presentationml/2006/ole">
             <mc:AlternateContent xmlns:mc="http://schemas.openxmlformats.org/markup-compatibility/2006">
               <mc:Choice xmlns:v="urn:schemas-microsoft-com:vml" Requires="v">
-                <p:oleObj spid="_x0000_s657419" name="Equation" r:id="rId5" imgW="1320800" imgH="266700" progId="Equation.DSMT4">
+                <p:oleObj spid="_x0000_s657421" name="Equation" r:id="rId5" imgW="1320800" imgH="266700" progId="Equation.DSMT4">
                   <p:embed/>
                 </p:oleObj>
               </mc:Choice>
@@ -13118,13 +13118,13 @@
   <p:clrMapOvr>
     <a:masterClrMapping/>
   </p:clrMapOvr>
-  <mc:AlternateContent xmlns:mc="http://schemas.openxmlformats.org/markup-compatibility/2006">
-    <mc:Choice xmlns:p14="http://schemas.microsoft.com/office/powerpoint/2010/main" Requires="p14">
+  <mc:AlternateContent xmlns:mc="http://schemas.openxmlformats.org/markup-compatibility/2006" xmlns:p14="http://schemas.microsoft.com/office/powerpoint/2010/main">
+    <mc:Choice Requires="p14">
       <p:transition spd="med" p14:dur="700">
         <p:fade/>
       </p:transition>
     </mc:Choice>
-    <mc:Fallback>
+    <mc:Fallback xmlns="">
       <p:transition xmlns:p14="http://schemas.microsoft.com/office/powerpoint/2010/main" spd="med">
         <p:fade/>
       </p:transition>
@@ -14380,13 +14380,13 @@
   <p:clrMapOvr>
     <a:masterClrMapping/>
   </p:clrMapOvr>
-  <mc:AlternateContent xmlns:mc="http://schemas.openxmlformats.org/markup-compatibility/2006">
-    <mc:Choice xmlns:p14="http://schemas.microsoft.com/office/powerpoint/2010/main" Requires="p14">
+  <mc:AlternateContent xmlns:mc="http://schemas.openxmlformats.org/markup-compatibility/2006" xmlns:p14="http://schemas.microsoft.com/office/powerpoint/2010/main">
+    <mc:Choice Requires="p14">
       <p:transition spd="med" p14:dur="700">
         <p:fade/>
       </p:transition>
     </mc:Choice>
-    <mc:Fallback>
+    <mc:Fallback xmlns="">
       <p:transition xmlns:p14="http://schemas.microsoft.com/office/powerpoint/2010/main" spd="med">
         <p:fade/>
       </p:transition>
@@ -15259,7 +15259,7 @@
           <a:graphicData uri="http://schemas.openxmlformats.org/presentationml/2006/ole">
             <mc:AlternateContent xmlns:mc="http://schemas.openxmlformats.org/markup-compatibility/2006">
               <mc:Choice xmlns:v="urn:schemas-microsoft-com:vml" Requires="v">
-                <p:oleObj spid="_x0000_s1090" name="Equation" r:id="rId4" imgW="2527300" imgH="457200" progId="Equation.DSMT4">
+                <p:oleObj spid="_x0000_s1093" name="Equation" r:id="rId4" imgW="2527300" imgH="457200" progId="Equation.DSMT4">
                   <p:embed/>
                 </p:oleObj>
               </mc:Choice>
@@ -15316,7 +15316,7 @@
           <a:graphicData uri="http://schemas.openxmlformats.org/presentationml/2006/ole">
             <mc:AlternateContent xmlns:mc="http://schemas.openxmlformats.org/markup-compatibility/2006">
               <mc:Choice xmlns:v="urn:schemas-microsoft-com:vml" Requires="v">
-                <p:oleObj spid="_x0000_s1091" name="Equation" r:id="rId6" imgW="749300" imgH="254000" progId="Equation.DSMT4">
+                <p:oleObj spid="_x0000_s1094" name="Equation" r:id="rId6" imgW="749300" imgH="254000" progId="Equation.DSMT4">
                   <p:embed/>
                 </p:oleObj>
               </mc:Choice>
@@ -18032,7 +18032,7 @@
           <a:graphicData uri="http://schemas.openxmlformats.org/presentationml/2006/ole">
             <mc:AlternateContent xmlns:mc="http://schemas.openxmlformats.org/markup-compatibility/2006">
               <mc:Choice xmlns:v="urn:schemas-microsoft-com:vml" Requires="v">
-                <p:oleObj spid="_x0000_s608333" name="Equation" r:id="rId3" imgW="2044700" imgH="457200" progId="Equation.DSMT4">
+                <p:oleObj spid="_x0000_s608336" name="Equation" r:id="rId3" imgW="2044700" imgH="457200" progId="Equation.DSMT4">
                   <p:embed/>
                 </p:oleObj>
               </mc:Choice>
@@ -18089,7 +18089,7 @@
           <a:graphicData uri="http://schemas.openxmlformats.org/presentationml/2006/ole">
             <mc:AlternateContent xmlns:mc="http://schemas.openxmlformats.org/markup-compatibility/2006">
               <mc:Choice xmlns:v="urn:schemas-microsoft-com:vml" Requires="v">
-                <p:oleObj spid="_x0000_s608334" name="Equation" r:id="rId5" imgW="622300" imgH="215900" progId="Equation.DSMT4">
+                <p:oleObj spid="_x0000_s608337" name="Equation" r:id="rId5" imgW="622300" imgH="215900" progId="Equation.DSMT4">
                   <p:embed/>
                 </p:oleObj>
               </mc:Choice>
@@ -18134,13 +18134,13 @@
   <p:clrMapOvr>
     <a:masterClrMapping/>
   </p:clrMapOvr>
-  <mc:AlternateContent xmlns:mc="http://schemas.openxmlformats.org/markup-compatibility/2006" xmlns:p14="http://schemas.microsoft.com/office/powerpoint/2010/main">
-    <mc:Choice Requires="p14">
+  <mc:AlternateContent xmlns:mc="http://schemas.openxmlformats.org/markup-compatibility/2006">
+    <mc:Choice xmlns:p14="http://schemas.microsoft.com/office/powerpoint/2010/main" Requires="p14">
       <p:transition spd="med" p14:dur="700">
         <p:fade/>
       </p:transition>
     </mc:Choice>
-    <mc:Fallback xmlns="">
+    <mc:Fallback>
       <p:transition xmlns:p14="http://schemas.microsoft.com/office/powerpoint/2010/main" spd="med">
         <p:fade/>
       </p:transition>
@@ -18381,7 +18381,7 @@
           <a:graphicData uri="http://schemas.openxmlformats.org/presentationml/2006/ole">
             <mc:AlternateContent xmlns:mc="http://schemas.openxmlformats.org/markup-compatibility/2006">
               <mc:Choice xmlns:v="urn:schemas-microsoft-com:vml" Requires="v">
-                <p:oleObj spid="_x0000_s612424" name="Equation" r:id="rId4" imgW="2692400" imgH="355600" progId="Equation.DSMT4">
+                <p:oleObj spid="_x0000_s612427" name="Equation" r:id="rId4" imgW="2692400" imgH="355600" progId="Equation.DSMT4">
                   <p:embed/>
                 </p:oleObj>
               </mc:Choice>
@@ -18438,7 +18438,7 @@
           <a:graphicData uri="http://schemas.openxmlformats.org/presentationml/2006/ole">
             <mc:AlternateContent xmlns:mc="http://schemas.openxmlformats.org/markup-compatibility/2006">
               <mc:Choice xmlns:v="urn:schemas-microsoft-com:vml" Requires="v">
-                <p:oleObj spid="_x0000_s612425" name="Equation" r:id="rId6" imgW="2971800" imgH="381000" progId="Equation.DSMT4">
+                <p:oleObj spid="_x0000_s612428" name="Equation" r:id="rId6" imgW="2971800" imgH="381000" progId="Equation.DSMT4">
                   <p:embed/>
                 </p:oleObj>
               </mc:Choice>
@@ -18711,7 +18711,7 @@
           <a:graphicData uri="http://schemas.openxmlformats.org/presentationml/2006/ole">
             <mc:AlternateContent xmlns:mc="http://schemas.openxmlformats.org/markup-compatibility/2006">
               <mc:Choice xmlns:v="urn:schemas-microsoft-com:vml" Requires="v">
-                <p:oleObj spid="_x0000_s659477" name="Equation" r:id="rId4" imgW="2768600" imgH="584200" progId="Equation.DSMT4">
+                <p:oleObj spid="_x0000_s659480" name="Equation" r:id="rId4" imgW="2768600" imgH="584200" progId="Equation.DSMT4">
                   <p:embed/>
                 </p:oleObj>
               </mc:Choice>
@@ -18830,7 +18830,7 @@
           <a:graphicData uri="http://schemas.openxmlformats.org/presentationml/2006/ole">
             <mc:AlternateContent xmlns:mc="http://schemas.openxmlformats.org/markup-compatibility/2006">
               <mc:Choice xmlns:v="urn:schemas-microsoft-com:vml" Requires="v">
-                <p:oleObj spid="_x0000_s659478" name="Equation" r:id="rId6" imgW="2959100" imgH="685800" progId="Equation.3">
+                <p:oleObj spid="_x0000_s659481" name="Equation" r:id="rId6" imgW="2959100" imgH="685800" progId="Equation.3">
                   <p:embed/>
                 </p:oleObj>
               </mc:Choice>
@@ -19074,7 +19074,7 @@
           <a:graphicData uri="http://schemas.openxmlformats.org/presentationml/2006/ole">
             <mc:AlternateContent xmlns:mc="http://schemas.openxmlformats.org/markup-compatibility/2006">
               <mc:Choice xmlns:v="urn:schemas-microsoft-com:vml" Requires="v">
-                <p:oleObj spid="_x0000_s613437" name="Equation" r:id="rId4" imgW="1473200" imgH="355600" progId="Equation.DSMT4">
+                <p:oleObj spid="_x0000_s613440" name="Equation" r:id="rId4" imgW="1473200" imgH="355600" progId="Equation.DSMT4">
                   <p:embed/>
                 </p:oleObj>
               </mc:Choice>
@@ -19131,7 +19131,7 @@
           <a:graphicData uri="http://schemas.openxmlformats.org/presentationml/2006/ole">
             <mc:AlternateContent xmlns:mc="http://schemas.openxmlformats.org/markup-compatibility/2006">
               <mc:Choice xmlns:v="urn:schemas-microsoft-com:vml" Requires="v">
-                <p:oleObj spid="_x0000_s613438" name="Equation" r:id="rId6" imgW="355600" imgH="177800" progId="Equation.DSMT4">
+                <p:oleObj spid="_x0000_s613441" name="Equation" r:id="rId6" imgW="355600" imgH="177800" progId="Equation.DSMT4">
                   <p:embed/>
                 </p:oleObj>
               </mc:Choice>
@@ -20607,7 +20607,7 @@
             <a:graphicData uri="http://schemas.openxmlformats.org/presentationml/2006/ole">
               <mc:AlternateContent xmlns:mc="http://schemas.openxmlformats.org/markup-compatibility/2006">
                 <mc:Choice xmlns:v="urn:schemas-microsoft-com:vml" Requires="v">
-                  <p:oleObj spid="_x0000_s614466" name="Equation" r:id="rId4" imgW="342900" imgH="177800" progId="Equation.DSMT4">
+                  <p:oleObj spid="_x0000_s614469" name="Equation" r:id="rId4" imgW="342900" imgH="177800" progId="Equation.DSMT4">
                     <p:embed/>
                   </p:oleObj>
                 </mc:Choice>
@@ -20716,7 +20716,7 @@
           <a:graphicData uri="http://schemas.openxmlformats.org/presentationml/2006/ole">
             <mc:AlternateContent xmlns:mc="http://schemas.openxmlformats.org/markup-compatibility/2006">
               <mc:Choice xmlns:v="urn:schemas-microsoft-com:vml" Requires="v">
-                <p:oleObj spid="_x0000_s614467" name="Equation" r:id="rId6" imgW="2565400" imgH="457200" progId="Equation.DSMT4">
+                <p:oleObj spid="_x0000_s614470" name="Equation" r:id="rId6" imgW="2565400" imgH="457200" progId="Equation.DSMT4">
                   <p:embed/>
                 </p:oleObj>
               </mc:Choice>
@@ -22119,13 +22119,13 @@
   <p:clrMapOvr>
     <a:masterClrMapping/>
   </p:clrMapOvr>
-  <mc:AlternateContent xmlns:mc="http://schemas.openxmlformats.org/markup-compatibility/2006">
-    <mc:Choice xmlns:p14="http://schemas.microsoft.com/office/powerpoint/2010/main" Requires="p14">
+  <mc:AlternateContent xmlns:mc="http://schemas.openxmlformats.org/markup-compatibility/2006" xmlns:p14="http://schemas.microsoft.com/office/powerpoint/2010/main">
+    <mc:Choice Requires="p14">
       <p:transition spd="med" p14:dur="700">
         <p:fade/>
       </p:transition>
     </mc:Choice>
-    <mc:Fallback>
+    <mc:Fallback xmlns="">
       <p:transition xmlns:p14="http://schemas.microsoft.com/office/powerpoint/2010/main" spd="med">
         <p:fade/>
       </p:transition>
@@ -23386,13 +23386,13 @@
   <p:clrMapOvr>
     <a:masterClrMapping/>
   </p:clrMapOvr>
-  <mc:AlternateContent xmlns:mc="http://schemas.openxmlformats.org/markup-compatibility/2006">
-    <mc:Choice xmlns:p14="http://schemas.microsoft.com/office/powerpoint/2010/main" Requires="p14">
+  <mc:AlternateContent xmlns:mc="http://schemas.openxmlformats.org/markup-compatibility/2006" xmlns:p14="http://schemas.microsoft.com/office/powerpoint/2010/main">
+    <mc:Choice Requires="p14">
       <p:transition spd="med" p14:dur="700">
         <p:fade/>
       </p:transition>
     </mc:Choice>
-    <mc:Fallback>
+    <mc:Fallback xmlns="">
       <p:transition xmlns:p14="http://schemas.microsoft.com/office/powerpoint/2010/main" spd="med">
         <p:fade/>
       </p:transition>
@@ -24653,13 +24653,13 @@
   <p:clrMapOvr>
     <a:masterClrMapping/>
   </p:clrMapOvr>
-  <mc:AlternateContent xmlns:mc="http://schemas.openxmlformats.org/markup-compatibility/2006">
-    <mc:Choice xmlns:p14="http://schemas.microsoft.com/office/powerpoint/2010/main" Requires="p14">
+  <mc:AlternateContent xmlns:mc="http://schemas.openxmlformats.org/markup-compatibility/2006" xmlns:p14="http://schemas.microsoft.com/office/powerpoint/2010/main">
+    <mc:Choice Requires="p14">
       <p:transition spd="med" p14:dur="700">
         <p:fade/>
       </p:transition>
     </mc:Choice>
-    <mc:Fallback>
+    <mc:Fallback xmlns="">
       <p:transition xmlns:p14="http://schemas.microsoft.com/office/powerpoint/2010/main" spd="med">
         <p:fade/>
       </p:transition>
@@ -24776,7 +24776,7 @@
           <a:graphicData uri="http://schemas.openxmlformats.org/presentationml/2006/ole">
             <mc:AlternateContent xmlns:mc="http://schemas.openxmlformats.org/markup-compatibility/2006">
               <mc:Choice xmlns:v="urn:schemas-microsoft-com:vml" Requires="v">
-                <p:oleObj spid="_x0000_s627848" name="Equation" r:id="rId4" imgW="1346200" imgH="228600" progId="Equation.3">
+                <p:oleObj spid="_x0000_s627855" name="Equation" r:id="rId4" imgW="1346200" imgH="228600" progId="Equation.3">
                   <p:embed/>
                 </p:oleObj>
               </mc:Choice>
@@ -24833,7 +24833,7 @@
           <a:graphicData uri="http://schemas.openxmlformats.org/presentationml/2006/ole">
             <mc:AlternateContent xmlns:mc="http://schemas.openxmlformats.org/markup-compatibility/2006">
               <mc:Choice xmlns:v="urn:schemas-microsoft-com:vml" Requires="v">
-                <p:oleObj spid="_x0000_s627849" name="Equation" r:id="rId6" imgW="2209800" imgH="228600" progId="Equation.DSMT4">
+                <p:oleObj spid="_x0000_s627856" name="Equation" r:id="rId6" imgW="2209800" imgH="228600" progId="Equation.DSMT4">
                   <p:embed/>
                 </p:oleObj>
               </mc:Choice>
@@ -24921,7 +24921,7 @@
           <a:graphicData uri="http://schemas.openxmlformats.org/presentationml/2006/ole">
             <mc:AlternateContent xmlns:mc="http://schemas.openxmlformats.org/markup-compatibility/2006">
               <mc:Choice xmlns:v="urn:schemas-microsoft-com:vml" Requires="v">
-                <p:oleObj spid="_x0000_s627850" name="Equation" r:id="rId8" imgW="965200" imgH="228600" progId="Equation.3">
+                <p:oleObj spid="_x0000_s627857" name="Equation" r:id="rId8" imgW="965200" imgH="228600" progId="Equation.3">
                   <p:embed/>
                 </p:oleObj>
               </mc:Choice>
@@ -24978,7 +24978,7 @@
           <a:graphicData uri="http://schemas.openxmlformats.org/presentationml/2006/ole">
             <mc:AlternateContent xmlns:mc="http://schemas.openxmlformats.org/markup-compatibility/2006">
               <mc:Choice xmlns:v="urn:schemas-microsoft-com:vml" Requires="v">
-                <p:oleObj spid="_x0000_s627851" name="Equation" r:id="rId10" imgW="1079500" imgH="469900" progId="Equation.DSMT4">
+                <p:oleObj spid="_x0000_s627858" name="Equation" r:id="rId10" imgW="1079500" imgH="469900" progId="Equation.DSMT4">
                   <p:embed/>
                 </p:oleObj>
               </mc:Choice>
@@ -25035,7 +25035,7 @@
           <a:graphicData uri="http://schemas.openxmlformats.org/presentationml/2006/ole">
             <mc:AlternateContent xmlns:mc="http://schemas.openxmlformats.org/markup-compatibility/2006">
               <mc:Choice xmlns:v="urn:schemas-microsoft-com:vml" Requires="v">
-                <p:oleObj spid="_x0000_s627852" name="Equation" r:id="rId12" imgW="1612900" imgH="330200" progId="Equation.DSMT4">
+                <p:oleObj spid="_x0000_s627859" name="Equation" r:id="rId12" imgW="1612900" imgH="330200" progId="Equation.DSMT4">
                   <p:embed/>
                 </p:oleObj>
               </mc:Choice>
@@ -25092,7 +25092,7 @@
           <a:graphicData uri="http://schemas.openxmlformats.org/presentationml/2006/ole">
             <mc:AlternateContent xmlns:mc="http://schemas.openxmlformats.org/markup-compatibility/2006">
               <mc:Choice xmlns:v="urn:schemas-microsoft-com:vml" Requires="v">
-                <p:oleObj spid="_x0000_s627853" name="Equation" r:id="rId14" imgW="406400" imgH="431800" progId="Equation.DSMT4">
+                <p:oleObj spid="_x0000_s627860" name="Equation" r:id="rId14" imgW="406400" imgH="431800" progId="Equation.DSMT4">
                   <p:embed/>
                 </p:oleObj>
               </mc:Choice>
@@ -26675,7 +26675,7 @@
           <a:graphicData uri="http://schemas.openxmlformats.org/presentationml/2006/ole">
             <mc:AlternateContent xmlns:mc="http://schemas.openxmlformats.org/markup-compatibility/2006">
               <mc:Choice xmlns:v="urn:schemas-microsoft-com:vml" Requires="v">
-                <p:oleObj spid="_x0000_s607337" name="Equation" r:id="rId4" imgW="1016000" imgH="215900" progId="Equation.DSMT4">
+                <p:oleObj spid="_x0000_s607340" name="Equation" r:id="rId4" imgW="1016000" imgH="215900" progId="Equation.DSMT4">
                   <p:embed/>
                 </p:oleObj>
               </mc:Choice>
@@ -26732,7 +26732,7 @@
           <a:graphicData uri="http://schemas.openxmlformats.org/presentationml/2006/ole">
             <mc:AlternateContent xmlns:mc="http://schemas.openxmlformats.org/markup-compatibility/2006">
               <mc:Choice xmlns:v="urn:schemas-microsoft-com:vml" Requires="v">
-                <p:oleObj spid="_x0000_s607338" name="Equation" r:id="rId6" imgW="2095500" imgH="355600" progId="Equation.3">
+                <p:oleObj spid="_x0000_s607341" name="Equation" r:id="rId6" imgW="2095500" imgH="355600" progId="Equation.3">
                   <p:embed/>
                 </p:oleObj>
               </mc:Choice>
@@ -27189,7 +27189,7 @@
           <a:graphicData uri="http://schemas.openxmlformats.org/presentationml/2006/ole">
             <mc:AlternateContent xmlns:mc="http://schemas.openxmlformats.org/markup-compatibility/2006">
               <mc:Choice xmlns:v="urn:schemas-microsoft-com:vml" Requires="v">
-                <p:oleObj spid="_x0000_s658456" name="Equation" r:id="rId4" imgW="2095500" imgH="355600" progId="Equation.3">
+                <p:oleObj spid="_x0000_s658459" name="Equation" r:id="rId4" imgW="2095500" imgH="355600" progId="Equation.3">
                   <p:embed/>
                 </p:oleObj>
               </mc:Choice>
@@ -27226,27 +27226,27 @@
       </p:graphicFrame>
       <p:graphicFrame>
         <p:nvGraphicFramePr>
-          <p:cNvPr id="3" name="Object 2"/>
+          <p:cNvPr id="5" name="Object 4"/>
           <p:cNvGraphicFramePr>
             <a:graphicFrameLocks noChangeAspect="1"/>
           </p:cNvGraphicFramePr>
           <p:nvPr>
             <p:extLst>
               <p:ext uri="{D42A27DB-BD31-4B8C-83A1-F6EECF244321}">
-                <p14:modId xmlns:p14="http://schemas.microsoft.com/office/powerpoint/2010/main" val="3282882695"/>
+                <p14:modId xmlns:p14="http://schemas.microsoft.com/office/powerpoint/2010/main" val="3209477698"/>
               </p:ext>
             </p:extLst>
           </p:nvPr>
         </p:nvGraphicFramePr>
         <p:xfrm>
-          <a:off x="2699857" y="4201573"/>
-          <a:ext cx="3747461" cy="1648883"/>
+          <a:off x="2583240" y="4197343"/>
+          <a:ext cx="3891796" cy="1712390"/>
         </p:xfrm>
         <a:graphic>
           <a:graphicData uri="http://schemas.openxmlformats.org/presentationml/2006/ole">
             <mc:AlternateContent xmlns:mc="http://schemas.openxmlformats.org/markup-compatibility/2006">
               <mc:Choice xmlns:v="urn:schemas-microsoft-com:vml" Requires="v">
-                <p:oleObj spid="_x0000_s658457" name="Equation" r:id="rId6" imgW="635000" imgH="279400" progId="Equation.DSMT4">
+                <p:oleObj spid="_x0000_s658460" name="Equation" r:id="rId6" imgW="635000" imgH="279400" progId="Equation.DSMT4">
                   <p:embed/>
                 </p:oleObj>
               </mc:Choice>
@@ -27267,8 +27267,8 @@
                     </p:blipFill>
                     <p:spPr>
                       <a:xfrm>
-                        <a:off x="2699857" y="4201573"/>
-                        <a:ext cx="3747461" cy="1648883"/>
+                        <a:off x="2583240" y="4197343"/>
+                        <a:ext cx="3891796" cy="1712390"/>
                       </a:xfrm>
                       <a:prstGeom prst="rect">
                         <a:avLst/>
@@ -27297,7 +27297,136 @@
   <p:timing>
     <p:tnLst>
       <p:par>
-        <p:cTn xmlns:p14="http://schemas.microsoft.com/office/powerpoint/2010/main" id="1" dur="indefinite" restart="never" nodeType="tmRoot"/>
+        <p:cTn xmlns:p14="http://schemas.microsoft.com/office/powerpoint/2010/main" id="1" dur="indefinite" restart="never" nodeType="tmRoot">
+          <p:childTnLst>
+            <p:seq concurrent="1" nextAc="seek">
+              <p:cTn id="2" dur="indefinite" nodeType="mainSeq">
+                <p:childTnLst>
+                  <p:par>
+                    <p:cTn id="3" fill="hold">
+                      <p:stCondLst>
+                        <p:cond delay="indefinite"/>
+                      </p:stCondLst>
+                      <p:childTnLst>
+                        <p:par>
+                          <p:cTn id="4" fill="hold">
+                            <p:stCondLst>
+                              <p:cond delay="0"/>
+                            </p:stCondLst>
+                            <p:childTnLst>
+                              <p:par>
+                                <p:cTn id="5" presetID="22" presetClass="entr" presetSubtype="8" fill="hold" nodeType="clickEffect">
+                                  <p:stCondLst>
+                                    <p:cond delay="0"/>
+                                  </p:stCondLst>
+                                  <p:childTnLst>
+                                    <p:set>
+                                      <p:cBhvr>
+                                        <p:cTn id="6" dur="1" fill="hold">
+                                          <p:stCondLst>
+                                            <p:cond delay="0"/>
+                                          </p:stCondLst>
+                                        </p:cTn>
+                                        <p:tgtEl>
+                                          <p:spTgt spid="10"/>
+                                        </p:tgtEl>
+                                        <p:attrNameLst>
+                                          <p:attrName>style.visibility</p:attrName>
+                                        </p:attrNameLst>
+                                      </p:cBhvr>
+                                      <p:to>
+                                        <p:strVal val="visible"/>
+                                      </p:to>
+                                    </p:set>
+                                    <p:animEffect transition="in" filter="wipe(left)">
+                                      <p:cBhvr>
+                                        <p:cTn id="7" dur="1000"/>
+                                        <p:tgtEl>
+                                          <p:spTgt spid="10"/>
+                                        </p:tgtEl>
+                                      </p:cBhvr>
+                                    </p:animEffect>
+                                  </p:childTnLst>
+                                </p:cTn>
+                              </p:par>
+                            </p:childTnLst>
+                          </p:cTn>
+                        </p:par>
+                      </p:childTnLst>
+                    </p:cTn>
+                  </p:par>
+                  <p:par>
+                    <p:cTn id="8" fill="hold">
+                      <p:stCondLst>
+                        <p:cond delay="indefinite"/>
+                      </p:stCondLst>
+                      <p:childTnLst>
+                        <p:par>
+                          <p:cTn id="9" fill="hold">
+                            <p:stCondLst>
+                              <p:cond delay="0"/>
+                            </p:stCondLst>
+                            <p:childTnLst>
+                              <p:par>
+                                <p:cTn id="10" presetID="9" presetClass="entr" presetSubtype="0" fill="hold" nodeType="clickEffect">
+                                  <p:stCondLst>
+                                    <p:cond delay="0"/>
+                                  </p:stCondLst>
+                                  <p:childTnLst>
+                                    <p:set>
+                                      <p:cBhvr>
+                                        <p:cTn id="11" dur="1" fill="hold">
+                                          <p:stCondLst>
+                                            <p:cond delay="0"/>
+                                          </p:stCondLst>
+                                        </p:cTn>
+                                        <p:tgtEl>
+                                          <p:spTgt spid="5"/>
+                                        </p:tgtEl>
+                                        <p:attrNameLst>
+                                          <p:attrName>style.visibility</p:attrName>
+                                        </p:attrNameLst>
+                                      </p:cBhvr>
+                                      <p:to>
+                                        <p:strVal val="visible"/>
+                                      </p:to>
+                                    </p:set>
+                                    <p:animEffect transition="in" filter="dissolve">
+                                      <p:cBhvr>
+                                        <p:cTn id="12" dur="500"/>
+                                        <p:tgtEl>
+                                          <p:spTgt spid="5"/>
+                                        </p:tgtEl>
+                                      </p:cBhvr>
+                                    </p:animEffect>
+                                  </p:childTnLst>
+                                </p:cTn>
+                              </p:par>
+                            </p:childTnLst>
+                          </p:cTn>
+                        </p:par>
+                      </p:childTnLst>
+                    </p:cTn>
+                  </p:par>
+                </p:childTnLst>
+              </p:cTn>
+              <p:prevCondLst>
+                <p:cond evt="onPrev" delay="0">
+                  <p:tgtEl>
+                    <p:sldTgt/>
+                  </p:tgtEl>
+                </p:cond>
+              </p:prevCondLst>
+              <p:nextCondLst>
+                <p:cond evt="onNext" delay="0">
+                  <p:tgtEl>
+                    <p:sldTgt/>
+                  </p:tgtEl>
+                </p:cond>
+              </p:nextCondLst>
+            </p:seq>
+          </p:childTnLst>
+        </p:cTn>
       </p:par>
     </p:tnLst>
   </p:timing>
@@ -27509,13 +27638,13 @@
   <p:clrMapOvr>
     <a:masterClrMapping/>
   </p:clrMapOvr>
-  <mc:AlternateContent xmlns:mc="http://schemas.openxmlformats.org/markup-compatibility/2006">
-    <mc:Choice xmlns:p14="http://schemas.microsoft.com/office/powerpoint/2010/main" Requires="p14">
+  <mc:AlternateContent xmlns:mc="http://schemas.openxmlformats.org/markup-compatibility/2006" xmlns:p14="http://schemas.microsoft.com/office/powerpoint/2010/main">
+    <mc:Choice Requires="p14">
       <p:transition spd="slow" p14:dur="1200">
         <p:fade thruBlk="1"/>
       </p:transition>
     </mc:Choice>
-    <mc:Fallback>
+    <mc:Fallback xmlns="">
       <p:transition xmlns:p14="http://schemas.microsoft.com/office/powerpoint/2010/main" spd="slow">
         <p:fade thruBlk="1"/>
       </p:transition>
@@ -28954,13 +29083,13 @@
   <p:clrMapOvr>
     <a:masterClrMapping/>
   </p:clrMapOvr>
-  <mc:AlternateContent xmlns:mc="http://schemas.openxmlformats.org/markup-compatibility/2006">
-    <mc:Choice xmlns:p14="http://schemas.microsoft.com/office/powerpoint/2010/main" Requires="p14">
+  <mc:AlternateContent xmlns:mc="http://schemas.openxmlformats.org/markup-compatibility/2006" xmlns:p14="http://schemas.microsoft.com/office/powerpoint/2010/main">
+    <mc:Choice Requires="p14">
       <p:transition spd="med" p14:dur="700">
         <p:fade/>
       </p:transition>
     </mc:Choice>
-    <mc:Fallback>
+    <mc:Fallback xmlns="">
       <p:transition xmlns:p14="http://schemas.microsoft.com/office/powerpoint/2010/main" spd="med">
         <p:fade/>
       </p:transition>
@@ -30048,13 +30177,13 @@
   <p:clrMapOvr>
     <a:masterClrMapping/>
   </p:clrMapOvr>
-  <mc:AlternateContent xmlns:mc="http://schemas.openxmlformats.org/markup-compatibility/2006">
-    <mc:Choice xmlns:p14="http://schemas.microsoft.com/office/powerpoint/2010/main" Requires="p14">
+  <mc:AlternateContent xmlns:mc="http://schemas.openxmlformats.org/markup-compatibility/2006" xmlns:p14="http://schemas.microsoft.com/office/powerpoint/2010/main">
+    <mc:Choice Requires="p14">
       <p:transition spd="med" p14:dur="700">
         <p:fade/>
       </p:transition>
     </mc:Choice>
-    <mc:Fallback>
+    <mc:Fallback xmlns="">
       <p:transition xmlns:p14="http://schemas.microsoft.com/office/powerpoint/2010/main" spd="med">
         <p:fade/>
       </p:transition>
@@ -37081,7 +37210,7 @@
           <a:graphicData uri="http://schemas.openxmlformats.org/presentationml/2006/ole">
             <mc:AlternateContent xmlns:mc="http://schemas.openxmlformats.org/markup-compatibility/2006">
               <mc:Choice xmlns:v="urn:schemas-microsoft-com:vml" Requires="v">
-                <p:oleObj spid="_x0000_s599113" name="Equation" r:id="rId3" imgW="1422400" imgH="457200" progId="Equation.3">
+                <p:oleObj spid="_x0000_s599116" name="Equation" r:id="rId3" imgW="1422400" imgH="457200" progId="Equation.3">
                   <p:embed/>
                 </p:oleObj>
               </mc:Choice>
@@ -37176,7 +37305,7 @@
           <a:graphicData uri="http://schemas.openxmlformats.org/presentationml/2006/ole">
             <mc:AlternateContent xmlns:mc="http://schemas.openxmlformats.org/markup-compatibility/2006">
               <mc:Choice xmlns:v="urn:schemas-microsoft-com:vml" Requires="v">
-                <p:oleObj spid="_x0000_s599114" name="Equation" r:id="rId5" imgW="1422400" imgH="457200" progId="Equation.3">
+                <p:oleObj spid="_x0000_s599117" name="Equation" r:id="rId5" imgW="1422400" imgH="457200" progId="Equation.3">
                   <p:embed/>
                 </p:oleObj>
               </mc:Choice>
@@ -37259,11 +37388,11 @@
   <p:clrMapOvr>
     <a:masterClrMapping/>
   </p:clrMapOvr>
-  <mc:AlternateContent xmlns:mc="http://schemas.openxmlformats.org/markup-compatibility/2006" xmlns:p14="http://schemas.microsoft.com/office/powerpoint/2010/main">
-    <mc:Choice Requires="p14">
+  <mc:AlternateContent xmlns:mc="http://schemas.openxmlformats.org/markup-compatibility/2006">
+    <mc:Choice xmlns:p14="http://schemas.microsoft.com/office/powerpoint/2010/main" Requires="p14">
       <p:transition spd="slow" p14:dur="2000"/>
     </mc:Choice>
-    <mc:Fallback xmlns="">
+    <mc:Fallback>
       <p:transition xmlns:p14="http://schemas.microsoft.com/office/powerpoint/2010/main" spd="slow"/>
     </mc:Fallback>
   </mc:AlternateContent>
@@ -37975,11 +38104,11 @@
   <p:clrMapOvr>
     <a:masterClrMapping/>
   </p:clrMapOvr>
-  <mc:AlternateContent xmlns:mc="http://schemas.openxmlformats.org/markup-compatibility/2006" xmlns:p14="http://schemas.microsoft.com/office/powerpoint/2010/main">
-    <mc:Choice Requires="p14">
+  <mc:AlternateContent xmlns:mc="http://schemas.openxmlformats.org/markup-compatibility/2006">
+    <mc:Choice xmlns:p14="http://schemas.microsoft.com/office/powerpoint/2010/main" Requires="p14">
       <p:transition spd="slow" p14:dur="2000"/>
     </mc:Choice>
-    <mc:Fallback xmlns="">
+    <mc:Fallback>
       <p:transition xmlns:p14="http://schemas.microsoft.com/office/powerpoint/2010/main" spd="slow"/>
     </mc:Fallback>
   </mc:AlternateContent>
@@ -39630,13 +39759,13 @@
   <p:clrMapOvr>
     <a:masterClrMapping/>
   </p:clrMapOvr>
-  <mc:AlternateContent xmlns:mc="http://schemas.openxmlformats.org/markup-compatibility/2006">
-    <mc:Choice xmlns:p14="http://schemas.microsoft.com/office/powerpoint/2010/main" Requires="p14">
+  <mc:AlternateContent xmlns:mc="http://schemas.openxmlformats.org/markup-compatibility/2006" xmlns:p14="http://schemas.microsoft.com/office/powerpoint/2010/main">
+    <mc:Choice Requires="p14">
       <p:transition spd="med" p14:dur="700">
         <p:fade/>
       </p:transition>
     </mc:Choice>
-    <mc:Fallback>
+    <mc:Fallback xmlns="">
       <p:transition xmlns:p14="http://schemas.microsoft.com/office/powerpoint/2010/main" spd="med">
         <p:fade/>
       </p:transition>
@@ -43063,7 +43192,7 @@
           <a:graphicData uri="http://schemas.openxmlformats.org/presentationml/2006/ole">
             <mc:AlternateContent xmlns:mc="http://schemas.openxmlformats.org/markup-compatibility/2006">
               <mc:Choice xmlns:v="urn:schemas-microsoft-com:vml" Requires="v">
-                <p:oleObj spid="_x0000_s640039" name="Equation" r:id="rId4" imgW="1016000" imgH="355600" progId="Equation.DSMT4">
+                <p:oleObj spid="_x0000_s640042" name="Equation" r:id="rId4" imgW="1016000" imgH="355600" progId="Equation.DSMT4">
                   <p:embed/>
                 </p:oleObj>
               </mc:Choice>
@@ -43120,7 +43249,7 @@
           <a:graphicData uri="http://schemas.openxmlformats.org/presentationml/2006/ole">
             <mc:AlternateContent xmlns:mc="http://schemas.openxmlformats.org/markup-compatibility/2006">
               <mc:Choice xmlns:v="urn:schemas-microsoft-com:vml" Requires="v">
-                <p:oleObj spid="_x0000_s640040" name="Equation" r:id="rId6" imgW="2349500" imgH="508000" progId="Equation.DSMT4">
+                <p:oleObj spid="_x0000_s640043" name="Equation" r:id="rId6" imgW="2349500" imgH="508000" progId="Equation.DSMT4">
                   <p:embed/>
                 </p:oleObj>
               </mc:Choice>
@@ -48222,7 +48351,7 @@
           <a:graphicData uri="http://schemas.openxmlformats.org/presentationml/2006/ole">
             <mc:AlternateContent xmlns:mc="http://schemas.openxmlformats.org/markup-compatibility/2006">
               <mc:Choice xmlns:v="urn:schemas-microsoft-com:vml" Requires="v">
-                <p:oleObj spid="_x0000_s578681" name="Equation" r:id="rId5" imgW="1104900" imgH="508000" progId="Equation.DSMT4">
+                <p:oleObj spid="_x0000_s578684" name="Equation" r:id="rId5" imgW="1104900" imgH="508000" progId="Equation.DSMT4">
                   <p:embed/>
                 </p:oleObj>
               </mc:Choice>
@@ -48279,7 +48408,7 @@
           <a:graphicData uri="http://schemas.openxmlformats.org/presentationml/2006/ole">
             <mc:AlternateContent xmlns:mc="http://schemas.openxmlformats.org/markup-compatibility/2006">
               <mc:Choice xmlns:v="urn:schemas-microsoft-com:vml" Requires="v">
-                <p:oleObj spid="_x0000_s578682" name="Equation" r:id="rId7" imgW="939800" imgH="215900" progId="Equation.3">
+                <p:oleObj spid="_x0000_s578685" name="Equation" r:id="rId7" imgW="939800" imgH="215900" progId="Equation.3">
                   <p:embed/>
                 </p:oleObj>
               </mc:Choice>
@@ -48799,7 +48928,7 @@
           <a:graphicData uri="http://schemas.openxmlformats.org/presentationml/2006/ole">
             <mc:AlternateContent xmlns:mc="http://schemas.openxmlformats.org/markup-compatibility/2006">
               <mc:Choice xmlns:v="urn:schemas-microsoft-com:vml" Requires="v">
-                <p:oleObj spid="_x0000_s611424" name="Equation" r:id="rId5" imgW="1181100" imgH="508000" progId="Equation.DSMT4">
+                <p:oleObj spid="_x0000_s611428" name="Equation" r:id="rId5" imgW="1181100" imgH="508000" progId="Equation.DSMT4">
                   <p:embed/>
                 </p:oleObj>
               </mc:Choice>
@@ -48856,7 +48985,7 @@
           <a:graphicData uri="http://schemas.openxmlformats.org/presentationml/2006/ole">
             <mc:AlternateContent xmlns:mc="http://schemas.openxmlformats.org/markup-compatibility/2006">
               <mc:Choice xmlns:v="urn:schemas-microsoft-com:vml" Requires="v">
-                <p:oleObj spid="_x0000_s611425" name="Equation" r:id="rId7" imgW="749300" imgH="292100" progId="Equation.DSMT4">
+                <p:oleObj spid="_x0000_s611429" name="Equation" r:id="rId7" imgW="749300" imgH="292100" progId="Equation.DSMT4">
                   <p:embed/>
                 </p:oleObj>
               </mc:Choice>
@@ -48913,7 +49042,7 @@
           <a:graphicData uri="http://schemas.openxmlformats.org/presentationml/2006/ole">
             <mc:AlternateContent xmlns:mc="http://schemas.openxmlformats.org/markup-compatibility/2006">
               <mc:Choice xmlns:v="urn:schemas-microsoft-com:vml" Requires="v">
-                <p:oleObj spid="_x0000_s611426" name="Equation" r:id="rId9" imgW="1689100" imgH="330200" progId="Equation.DSMT4">
+                <p:oleObj spid="_x0000_s611430" name="Equation" r:id="rId9" imgW="1689100" imgH="330200" progId="Equation.DSMT4">
                   <p:embed/>
                 </p:oleObj>
               </mc:Choice>
@@ -49479,7 +49608,7 @@
           <a:graphicData uri="http://schemas.openxmlformats.org/presentationml/2006/ole">
             <mc:AlternateContent xmlns:mc="http://schemas.openxmlformats.org/markup-compatibility/2006">
               <mc:Choice xmlns:v="urn:schemas-microsoft-com:vml" Requires="v">
-                <p:oleObj spid="_x0000_s602215" name="Equation" r:id="rId3" imgW="660400" imgH="203200" progId="Equation.3">
+                <p:oleObj spid="_x0000_s602219" name="Equation" r:id="rId3" imgW="660400" imgH="203200" progId="Equation.3">
                   <p:embed/>
                 </p:oleObj>
               </mc:Choice>
@@ -49574,7 +49703,7 @@
           <a:graphicData uri="http://schemas.openxmlformats.org/presentationml/2006/ole">
             <mc:AlternateContent xmlns:mc="http://schemas.openxmlformats.org/markup-compatibility/2006">
               <mc:Choice xmlns:v="urn:schemas-microsoft-com:vml" Requires="v">
-                <p:oleObj spid="_x0000_s602216" name="Equation" r:id="rId5" imgW="583947" imgH="203112" progId="Equation.DSMT4">
+                <p:oleObj spid="_x0000_s602220" name="Equation" r:id="rId5" imgW="583947" imgH="203112" progId="Equation.DSMT4">
                   <p:embed/>
                 </p:oleObj>
               </mc:Choice>
@@ -49675,7 +49804,7 @@
           <a:graphicData uri="http://schemas.openxmlformats.org/presentationml/2006/ole">
             <mc:AlternateContent xmlns:mc="http://schemas.openxmlformats.org/markup-compatibility/2006">
               <mc:Choice xmlns:v="urn:schemas-microsoft-com:vml" Requires="v">
-                <p:oleObj spid="_x0000_s602217" name="Equation" r:id="rId7" imgW="393359" imgH="177646" progId="Equation.3">
+                <p:oleObj spid="_x0000_s602221" name="Equation" r:id="rId7" imgW="393359" imgH="177646" progId="Equation.3">
                   <p:embed/>
                 </p:oleObj>
               </mc:Choice>
@@ -49734,11 +49863,11 @@
   <p:clrMapOvr>
     <a:masterClrMapping/>
   </p:clrMapOvr>
-  <mc:AlternateContent xmlns:mc="http://schemas.openxmlformats.org/markup-compatibility/2006" xmlns:p14="http://schemas.microsoft.com/office/powerpoint/2010/main">
-    <mc:Choice Requires="p14">
+  <mc:AlternateContent xmlns:mc="http://schemas.openxmlformats.org/markup-compatibility/2006">
+    <mc:Choice xmlns:p14="http://schemas.microsoft.com/office/powerpoint/2010/main" Requires="p14">
       <p:transition spd="slow" p14:dur="2000"/>
     </mc:Choice>
-    <mc:Fallback xmlns="">
+    <mc:Fallback>
       <p:transition xmlns:p14="http://schemas.microsoft.com/office/powerpoint/2010/main" spd="slow"/>
     </mc:Fallback>
   </mc:AlternateContent>
@@ -50087,7 +50216,7 @@
           <a:graphicData uri="http://schemas.openxmlformats.org/presentationml/2006/ole">
             <mc:AlternateContent xmlns:mc="http://schemas.openxmlformats.org/markup-compatibility/2006">
               <mc:Choice xmlns:v="urn:schemas-microsoft-com:vml" Requires="v">
-                <p:oleObj spid="_x0000_s603209" name="Equation" r:id="rId3" imgW="609600" imgH="190500" progId="Equation.3">
+                <p:oleObj spid="_x0000_s603212" name="Equation" r:id="rId3" imgW="609600" imgH="190500" progId="Equation.3">
                   <p:embed/>
                 </p:oleObj>
               </mc:Choice>
@@ -50182,7 +50311,7 @@
           <a:graphicData uri="http://schemas.openxmlformats.org/presentationml/2006/ole">
             <mc:AlternateContent xmlns:mc="http://schemas.openxmlformats.org/markup-compatibility/2006">
               <mc:Choice xmlns:v="urn:schemas-microsoft-com:vml" Requires="v">
-                <p:oleObj spid="_x0000_s603210" name="Equation" r:id="rId5" imgW="165100" imgH="165100" progId="Equation.DSMT4">
+                <p:oleObj spid="_x0000_s603213" name="Equation" r:id="rId5" imgW="165100" imgH="165100" progId="Equation.DSMT4">
                   <p:embed/>
                 </p:oleObj>
               </mc:Choice>
@@ -50227,11 +50356,11 @@
   <p:clrMapOvr>
     <a:masterClrMapping/>
   </p:clrMapOvr>
-  <mc:AlternateContent xmlns:mc="http://schemas.openxmlformats.org/markup-compatibility/2006" xmlns:p14="http://schemas.microsoft.com/office/powerpoint/2010/main">
-    <mc:Choice Requires="p14">
+  <mc:AlternateContent xmlns:mc="http://schemas.openxmlformats.org/markup-compatibility/2006">
+    <mc:Choice xmlns:p14="http://schemas.microsoft.com/office/powerpoint/2010/main" Requires="p14">
       <p:transition spd="slow" p14:dur="2000"/>
     </mc:Choice>
-    <mc:Fallback xmlns="">
+    <mc:Fallback>
       <p:transition xmlns:p14="http://schemas.microsoft.com/office/powerpoint/2010/main" spd="slow"/>
     </mc:Fallback>
   </mc:AlternateContent>
@@ -50609,7 +50738,7 @@
           <a:graphicData uri="http://schemas.openxmlformats.org/presentationml/2006/ole">
             <mc:AlternateContent xmlns:mc="http://schemas.openxmlformats.org/markup-compatibility/2006">
               <mc:Choice xmlns:v="urn:schemas-microsoft-com:vml" Requires="v">
-                <p:oleObj spid="_x0000_s606277" name="Equation" r:id="rId3" imgW="660113" imgH="203112" progId="Equation.DSMT4">
+                <p:oleObj spid="_x0000_s606280" name="Equation" r:id="rId3" imgW="660113" imgH="203112" progId="Equation.DSMT4">
                   <p:embed/>
                 </p:oleObj>
               </mc:Choice>
@@ -50704,7 +50833,7 @@
           <a:graphicData uri="http://schemas.openxmlformats.org/presentationml/2006/ole">
             <mc:AlternateContent xmlns:mc="http://schemas.openxmlformats.org/markup-compatibility/2006">
               <mc:Choice xmlns:v="urn:schemas-microsoft-com:vml" Requires="v">
-                <p:oleObj spid="_x0000_s606278" name="Equation" r:id="rId5" imgW="1485900" imgH="203200" progId="Equation.3">
+                <p:oleObj spid="_x0000_s606281" name="Equation" r:id="rId5" imgW="1485900" imgH="203200" progId="Equation.3">
                   <p:embed/>
                 </p:oleObj>
               </mc:Choice>
@@ -51931,13 +52060,13 @@
   <p:clrMapOvr>
     <a:masterClrMapping/>
   </p:clrMapOvr>
-  <mc:AlternateContent xmlns:mc="http://schemas.openxmlformats.org/markup-compatibility/2006">
-    <mc:Choice xmlns:p14="http://schemas.microsoft.com/office/powerpoint/2010/main" Requires="p14">
+  <mc:AlternateContent xmlns:mc="http://schemas.openxmlformats.org/markup-compatibility/2006" xmlns:p14="http://schemas.microsoft.com/office/powerpoint/2010/main">
+    <mc:Choice Requires="p14">
       <p:transition spd="med" p14:dur="700">
         <p:fade/>
       </p:transition>
     </mc:Choice>
-    <mc:Fallback>
+    <mc:Fallback xmlns="">
       <p:transition xmlns:p14="http://schemas.microsoft.com/office/powerpoint/2010/main" spd="med">
         <p:fade/>
       </p:transition>

</xml_diff>